<commit_message>
amend note of SAMCLIP
</commit_message>
<xml_diff>
--- a/SAM-CLIP-2401.12665v2.pptx
+++ b/SAM-CLIP-2401.12665v2.pptx
@@ -9,6 +9,14 @@
     <p:sldId id="257" r:id="rId3"/>
     <p:sldId id="258" r:id="rId4"/>
     <p:sldId id="259" r:id="rId5"/>
+    <p:sldId id="260" r:id="rId6"/>
+    <p:sldId id="261" r:id="rId7"/>
+    <p:sldId id="262" r:id="rId8"/>
+    <p:sldId id="263" r:id="rId9"/>
+    <p:sldId id="264" r:id="rId10"/>
+    <p:sldId id="265" r:id="rId11"/>
+    <p:sldId id="266" r:id="rId12"/>
+    <p:sldId id="267" r:id="rId13"/>
   </p:sldIdLst>
   <p:sldSz cx="12192000" cy="6858000"/>
   <p:notesSz cx="6858000" cy="9144000"/>
@@ -3405,6 +3413,1271 @@
 </p:sld>
 </file>
 
+<file path=ppt/slides/slide10.xml><?xml version="1.0" encoding="utf-8"?>
+<p:sld xmlns:a="http://schemas.openxmlformats.org/drawingml/2006/main" xmlns:r="http://schemas.openxmlformats.org/officeDocument/2006/relationships" xmlns:p="http://schemas.openxmlformats.org/presentationml/2006/main">
+  <p:cSld>
+    <p:spTree>
+      <p:nvGrpSpPr>
+        <p:cNvPr id="1" name=""/>
+        <p:cNvGrpSpPr/>
+        <p:nvPr/>
+      </p:nvGrpSpPr>
+      <p:grpSpPr>
+        <a:xfrm>
+          <a:off x="0" y="0"/>
+          <a:ext cx="0" cy="0"/>
+          <a:chOff x="0" y="0"/>
+          <a:chExt cx="0" cy="0"/>
+        </a:xfrm>
+      </p:grpSpPr>
+      <p:sp>
+        <p:nvSpPr>
+          <p:cNvPr id="2" name="标题 1">
+            <a:extLst>
+              <a:ext uri="{FF2B5EF4-FFF2-40B4-BE49-F238E27FC236}">
+                <a16:creationId xmlns:a16="http://schemas.microsoft.com/office/drawing/2014/main" id="{20618421-B59A-AC9B-4C2B-A4D78327CE22}"/>
+              </a:ext>
+            </a:extLst>
+          </p:cNvPr>
+          <p:cNvSpPr>
+            <a:spLocks noGrp="1"/>
+          </p:cNvSpPr>
+          <p:nvPr>
+            <p:ph type="title"/>
+          </p:nvPr>
+        </p:nvSpPr>
+        <p:spPr>
+          <a:xfrm>
+            <a:off x="61313" y="457200"/>
+            <a:ext cx="3546860" cy="1600200"/>
+          </a:xfrm>
+        </p:spPr>
+        <p:txBody>
+          <a:bodyPr/>
+          <a:lstStyle/>
+          <a:p>
+            <a:r>
+              <a:rPr lang="en-US" altLang="zh-CN" dirty="0"/>
+              <a:t>3.Methodology</a:t>
+            </a:r>
+            <a:endParaRPr lang="zh-CN" altLang="en-US" dirty="0"/>
+          </a:p>
+        </p:txBody>
+      </p:sp>
+      <p:sp>
+        <p:nvSpPr>
+          <p:cNvPr id="4" name="文本占位符 3">
+            <a:extLst>
+              <a:ext uri="{FF2B5EF4-FFF2-40B4-BE49-F238E27FC236}">
+                <a16:creationId xmlns:a16="http://schemas.microsoft.com/office/drawing/2014/main" id="{351E9848-A693-DC47-CE0F-2FA538003518}"/>
+              </a:ext>
+            </a:extLst>
+          </p:cNvPr>
+          <p:cNvSpPr>
+            <a:spLocks noGrp="1"/>
+          </p:cNvSpPr>
+          <p:nvPr>
+            <p:ph type="body" sz="half" idx="2"/>
+          </p:nvPr>
+        </p:nvSpPr>
+        <p:spPr>
+          <a:xfrm>
+            <a:off x="61312" y="2057400"/>
+            <a:ext cx="3546861" cy="3811588"/>
+          </a:xfrm>
+        </p:spPr>
+        <p:txBody>
+          <a:bodyPr/>
+          <a:lstStyle/>
+          <a:p>
+            <a:r>
+              <a:rPr lang="en-US" altLang="zh-CN" dirty="0"/>
+              <a:t>3.1 CLIP and SAM Collaboration</a:t>
+            </a:r>
+          </a:p>
+          <a:p>
+            <a:r>
+              <a:rPr lang="en-US" altLang="zh-CN" dirty="0"/>
+              <a:t>3.2 </a:t>
+            </a:r>
+            <a:r>
+              <a:rPr lang="en-US" altLang="zh-CN" dirty="0">
+                <a:highlight>
+                  <a:srgbClr val="FFFF00"/>
+                </a:highlight>
+              </a:rPr>
+              <a:t>Unified Multi-scale Cross-modal Interaction</a:t>
+            </a:r>
+          </a:p>
+          <a:p>
+            <a:r>
+              <a:rPr lang="en-US" altLang="zh-CN" dirty="0"/>
+              <a:t>3.3 Multi-level Mask Refinement</a:t>
+            </a:r>
+          </a:p>
+          <a:p>
+            <a:r>
+              <a:rPr lang="en-US" altLang="zh-CN" dirty="0"/>
+              <a:t>3.4 Objective Function</a:t>
+            </a:r>
+            <a:endParaRPr lang="zh-CN" altLang="en-US" dirty="0"/>
+          </a:p>
+        </p:txBody>
+      </p:sp>
+      <p:pic>
+        <p:nvPicPr>
+          <p:cNvPr id="7" name="内容占位符 6">
+            <a:extLst>
+              <a:ext uri="{FF2B5EF4-FFF2-40B4-BE49-F238E27FC236}">
+                <a16:creationId xmlns:a16="http://schemas.microsoft.com/office/drawing/2014/main" id="{31F13812-BC73-DBA3-5CF1-07DF36AB47A4}"/>
+              </a:ext>
+            </a:extLst>
+          </p:cNvPr>
+          <p:cNvPicPr>
+            <a:picLocks noGrp="1" noChangeAspect="1"/>
+          </p:cNvPicPr>
+          <p:nvPr>
+            <p:ph idx="1"/>
+          </p:nvPr>
+        </p:nvPicPr>
+        <p:blipFill>
+          <a:blip r:embed="rId2"/>
+          <a:stretch>
+            <a:fillRect/>
+          </a:stretch>
+        </p:blipFill>
+        <p:spPr>
+          <a:xfrm>
+            <a:off x="3324218" y="1736128"/>
+            <a:ext cx="8867782" cy="3015046"/>
+          </a:xfrm>
+          <a:prstGeom prst="rect">
+            <a:avLst/>
+          </a:prstGeom>
+        </p:spPr>
+      </p:pic>
+    </p:spTree>
+    <p:extLst>
+      <p:ext uri="{BB962C8B-B14F-4D97-AF65-F5344CB8AC3E}">
+        <p14:creationId xmlns:p14="http://schemas.microsoft.com/office/powerpoint/2010/main" val="3158036617"/>
+      </p:ext>
+    </p:extLst>
+  </p:cSld>
+  <p:clrMapOvr>
+    <a:masterClrMapping/>
+  </p:clrMapOvr>
+</p:sld>
+</file>
+
+<file path=ppt/slides/slide11.xml><?xml version="1.0" encoding="utf-8"?>
+<p:sld xmlns:a="http://schemas.openxmlformats.org/drawingml/2006/main" xmlns:r="http://schemas.openxmlformats.org/officeDocument/2006/relationships" xmlns:p="http://schemas.openxmlformats.org/presentationml/2006/main">
+  <p:cSld>
+    <p:spTree>
+      <p:nvGrpSpPr>
+        <p:cNvPr id="1" name=""/>
+        <p:cNvGrpSpPr/>
+        <p:nvPr/>
+      </p:nvGrpSpPr>
+      <p:grpSpPr>
+        <a:xfrm>
+          <a:off x="0" y="0"/>
+          <a:ext cx="0" cy="0"/>
+          <a:chOff x="0" y="0"/>
+          <a:chExt cx="0" cy="0"/>
+        </a:xfrm>
+      </p:grpSpPr>
+      <p:sp>
+        <p:nvSpPr>
+          <p:cNvPr id="2" name="标题 1">
+            <a:extLst>
+              <a:ext uri="{FF2B5EF4-FFF2-40B4-BE49-F238E27FC236}">
+                <a16:creationId xmlns:a16="http://schemas.microsoft.com/office/drawing/2014/main" id="{20618421-B59A-AC9B-4C2B-A4D78327CE22}"/>
+              </a:ext>
+            </a:extLst>
+          </p:cNvPr>
+          <p:cNvSpPr>
+            <a:spLocks noGrp="1"/>
+          </p:cNvSpPr>
+          <p:nvPr>
+            <p:ph type="title"/>
+          </p:nvPr>
+        </p:nvSpPr>
+        <p:spPr>
+          <a:xfrm>
+            <a:off x="61313" y="457200"/>
+            <a:ext cx="3546860" cy="1600200"/>
+          </a:xfrm>
+        </p:spPr>
+        <p:txBody>
+          <a:bodyPr/>
+          <a:lstStyle/>
+          <a:p>
+            <a:r>
+              <a:rPr lang="en-US" altLang="zh-CN" dirty="0"/>
+              <a:t>3.Methodology</a:t>
+            </a:r>
+            <a:endParaRPr lang="zh-CN" altLang="en-US" dirty="0"/>
+          </a:p>
+        </p:txBody>
+      </p:sp>
+      <p:sp>
+        <p:nvSpPr>
+          <p:cNvPr id="4" name="文本占位符 3">
+            <a:extLst>
+              <a:ext uri="{FF2B5EF4-FFF2-40B4-BE49-F238E27FC236}">
+                <a16:creationId xmlns:a16="http://schemas.microsoft.com/office/drawing/2014/main" id="{351E9848-A693-DC47-CE0F-2FA538003518}"/>
+              </a:ext>
+            </a:extLst>
+          </p:cNvPr>
+          <p:cNvSpPr>
+            <a:spLocks noGrp="1"/>
+          </p:cNvSpPr>
+          <p:nvPr>
+            <p:ph type="body" sz="half" idx="2"/>
+          </p:nvPr>
+        </p:nvSpPr>
+        <p:spPr>
+          <a:xfrm>
+            <a:off x="61312" y="2057400"/>
+            <a:ext cx="3546861" cy="3811588"/>
+          </a:xfrm>
+        </p:spPr>
+        <p:txBody>
+          <a:bodyPr/>
+          <a:lstStyle/>
+          <a:p>
+            <a:r>
+              <a:rPr lang="en-US" altLang="zh-CN" dirty="0"/>
+              <a:t>3.1 CLIP and SAM Collaboration</a:t>
+            </a:r>
+          </a:p>
+          <a:p>
+            <a:r>
+              <a:rPr lang="en-US" altLang="zh-CN" dirty="0"/>
+              <a:t>3.2 </a:t>
+            </a:r>
+            <a:r>
+              <a:rPr lang="en-US" altLang="zh-CN" dirty="0">
+                <a:highlight>
+                  <a:srgbClr val="FFFF00"/>
+                </a:highlight>
+              </a:rPr>
+              <a:t>Unified Multi-scale Cross-modal Interaction</a:t>
+            </a:r>
+          </a:p>
+          <a:p>
+            <a:r>
+              <a:rPr lang="en-US" altLang="zh-CN" dirty="0"/>
+              <a:t>3.3 Multi-level Mask Refinement</a:t>
+            </a:r>
+          </a:p>
+          <a:p>
+            <a:r>
+              <a:rPr lang="en-US" altLang="zh-CN" dirty="0"/>
+              <a:t>3.4 Objective Function</a:t>
+            </a:r>
+            <a:endParaRPr lang="zh-CN" altLang="en-US" dirty="0"/>
+          </a:p>
+        </p:txBody>
+      </p:sp>
+      <p:sp>
+        <p:nvSpPr>
+          <p:cNvPr id="5" name="内容占位符 4">
+            <a:extLst>
+              <a:ext uri="{FF2B5EF4-FFF2-40B4-BE49-F238E27FC236}">
+                <a16:creationId xmlns:a16="http://schemas.microsoft.com/office/drawing/2014/main" id="{7CCA9E6E-8FDB-96E0-EBA0-9DCC32D45C7A}"/>
+              </a:ext>
+            </a:extLst>
+          </p:cNvPr>
+          <p:cNvSpPr>
+            <a:spLocks noGrp="1"/>
+          </p:cNvSpPr>
+          <p:nvPr>
+            <p:ph idx="1"/>
+          </p:nvPr>
+        </p:nvSpPr>
+        <p:spPr>
+          <a:xfrm>
+            <a:off x="3447535" y="0"/>
+            <a:ext cx="8744465" cy="6857999"/>
+          </a:xfrm>
+        </p:spPr>
+        <p:txBody>
+          <a:bodyPr/>
+          <a:lstStyle/>
+          <a:p>
+            <a:r>
+              <a:rPr lang="en-US" altLang="zh-CN" dirty="0"/>
+              <a:t>UMCI consists of two path: Strip Paths and Scale Path.</a:t>
+            </a:r>
+          </a:p>
+          <a:p>
+            <a:pPr marL="0" indent="0">
+              <a:buNone/>
+            </a:pPr>
+            <a:r>
+              <a:rPr lang="en-US" altLang="zh-CN" dirty="0"/>
+              <a:t>(1).Strip Paths captures both row- and column-level features.</a:t>
+            </a:r>
+          </a:p>
+          <a:p>
+            <a:pPr marL="0" indent="0">
+              <a:buNone/>
+            </a:pPr>
+            <a:r>
+              <a:rPr lang="en-US" altLang="zh-CN" dirty="0"/>
+              <a:t>(2).Scale Paths grasps the  image’s global features of various scales.</a:t>
+            </a:r>
+          </a:p>
+          <a:p>
+            <a:pPr marL="0" indent="0">
+              <a:buNone/>
+            </a:pPr>
+            <a:endParaRPr lang="zh-CN" altLang="en-US" dirty="0"/>
+          </a:p>
+        </p:txBody>
+      </p:sp>
+    </p:spTree>
+    <p:extLst>
+      <p:ext uri="{BB962C8B-B14F-4D97-AF65-F5344CB8AC3E}">
+        <p14:creationId xmlns:p14="http://schemas.microsoft.com/office/powerpoint/2010/main" val="2240833683"/>
+      </p:ext>
+    </p:extLst>
+  </p:cSld>
+  <p:clrMapOvr>
+    <a:masterClrMapping/>
+  </p:clrMapOvr>
+</p:sld>
+</file>
+
+<file path=ppt/slides/slide12.xml><?xml version="1.0" encoding="utf-8"?>
+<p:sld xmlns:a="http://schemas.openxmlformats.org/drawingml/2006/main" xmlns:r="http://schemas.openxmlformats.org/officeDocument/2006/relationships" xmlns:p="http://schemas.openxmlformats.org/presentationml/2006/main">
+  <p:cSld>
+    <p:spTree>
+      <p:nvGrpSpPr>
+        <p:cNvPr id="1" name=""/>
+        <p:cNvGrpSpPr/>
+        <p:nvPr/>
+      </p:nvGrpSpPr>
+      <p:grpSpPr>
+        <a:xfrm>
+          <a:off x="0" y="0"/>
+          <a:ext cx="0" cy="0"/>
+          <a:chOff x="0" y="0"/>
+          <a:chExt cx="0" cy="0"/>
+        </a:xfrm>
+      </p:grpSpPr>
+      <p:sp>
+        <p:nvSpPr>
+          <p:cNvPr id="2" name="标题 1">
+            <a:extLst>
+              <a:ext uri="{FF2B5EF4-FFF2-40B4-BE49-F238E27FC236}">
+                <a16:creationId xmlns:a16="http://schemas.microsoft.com/office/drawing/2014/main" id="{20618421-B59A-AC9B-4C2B-A4D78327CE22}"/>
+              </a:ext>
+            </a:extLst>
+          </p:cNvPr>
+          <p:cNvSpPr>
+            <a:spLocks noGrp="1"/>
+          </p:cNvSpPr>
+          <p:nvPr>
+            <p:ph type="title"/>
+          </p:nvPr>
+        </p:nvSpPr>
+        <p:spPr>
+          <a:xfrm>
+            <a:off x="61313" y="457200"/>
+            <a:ext cx="3546860" cy="1600200"/>
+          </a:xfrm>
+        </p:spPr>
+        <p:txBody>
+          <a:bodyPr/>
+          <a:lstStyle/>
+          <a:p>
+            <a:r>
+              <a:rPr lang="en-US" altLang="zh-CN" dirty="0"/>
+              <a:t>3.Methodology</a:t>
+            </a:r>
+            <a:endParaRPr lang="zh-CN" altLang="en-US" dirty="0"/>
+          </a:p>
+        </p:txBody>
+      </p:sp>
+      <p:sp>
+        <p:nvSpPr>
+          <p:cNvPr id="4" name="文本占位符 3">
+            <a:extLst>
+              <a:ext uri="{FF2B5EF4-FFF2-40B4-BE49-F238E27FC236}">
+                <a16:creationId xmlns:a16="http://schemas.microsoft.com/office/drawing/2014/main" id="{351E9848-A693-DC47-CE0F-2FA538003518}"/>
+              </a:ext>
+            </a:extLst>
+          </p:cNvPr>
+          <p:cNvSpPr>
+            <a:spLocks noGrp="1"/>
+          </p:cNvSpPr>
+          <p:nvPr>
+            <p:ph type="body" sz="half" idx="2"/>
+          </p:nvPr>
+        </p:nvSpPr>
+        <p:spPr>
+          <a:xfrm>
+            <a:off x="61312" y="2057400"/>
+            <a:ext cx="3546861" cy="3811588"/>
+          </a:xfrm>
+        </p:spPr>
+        <p:txBody>
+          <a:bodyPr/>
+          <a:lstStyle/>
+          <a:p>
+            <a:r>
+              <a:rPr lang="en-US" altLang="zh-CN" dirty="0"/>
+              <a:t>3.1 CLIP and SAM Collaboration</a:t>
+            </a:r>
+          </a:p>
+          <a:p>
+            <a:r>
+              <a:rPr lang="en-US" altLang="zh-CN" dirty="0"/>
+              <a:t>3.2 </a:t>
+            </a:r>
+            <a:r>
+              <a:rPr lang="en-US" altLang="zh-CN" dirty="0">
+                <a:highlight>
+                  <a:srgbClr val="FFFF00"/>
+                </a:highlight>
+              </a:rPr>
+              <a:t>Unified Multi-scale Cross-modal Interaction</a:t>
+            </a:r>
+          </a:p>
+          <a:p>
+            <a:r>
+              <a:rPr lang="en-US" altLang="zh-CN" dirty="0"/>
+              <a:t>3.3 Multi-level Mask Refinement</a:t>
+            </a:r>
+          </a:p>
+          <a:p>
+            <a:r>
+              <a:rPr lang="en-US" altLang="zh-CN" dirty="0"/>
+              <a:t>3.4 Objective Function</a:t>
+            </a:r>
+            <a:endParaRPr lang="zh-CN" altLang="en-US" dirty="0"/>
+          </a:p>
+        </p:txBody>
+      </p:sp>
+      <mc:AlternateContent xmlns:mc="http://schemas.openxmlformats.org/markup-compatibility/2006">
+        <mc:Choice xmlns:a14="http://schemas.microsoft.com/office/drawing/2010/main" Requires="a14">
+          <p:sp>
+            <p:nvSpPr>
+              <p:cNvPr id="5" name="内容占位符 4">
+                <a:extLst>
+                  <a:ext uri="{FF2B5EF4-FFF2-40B4-BE49-F238E27FC236}">
+                    <a16:creationId xmlns:a16="http://schemas.microsoft.com/office/drawing/2014/main" id="{7CCA9E6E-8FDB-96E0-EBA0-9DCC32D45C7A}"/>
+                  </a:ext>
+                </a:extLst>
+              </p:cNvPr>
+              <p:cNvSpPr>
+                <a:spLocks noGrp="1"/>
+              </p:cNvSpPr>
+              <p:nvPr>
+                <p:ph idx="1"/>
+              </p:nvPr>
+            </p:nvSpPr>
+            <p:spPr>
+              <a:xfrm>
+                <a:off x="3447535" y="0"/>
+                <a:ext cx="8744465" cy="6857999"/>
+              </a:xfrm>
+            </p:spPr>
+            <p:txBody>
+              <a:bodyPr/>
+              <a:lstStyle/>
+              <a:p>
+                <a:pPr marL="0" indent="0">
+                  <a:buNone/>
+                </a:pPr>
+                <a:r>
+                  <a:rPr lang="en-US" altLang="zh-CN" dirty="0"/>
+                  <a:t>(1).</a:t>
+                </a:r>
+                <a:r>
+                  <a:rPr lang="en-US" altLang="zh-CN" b="1" dirty="0"/>
+                  <a:t>Strip Paths</a:t>
+                </a:r>
+                <a:r>
+                  <a:rPr lang="en-US" altLang="zh-CN" dirty="0"/>
+                  <a:t> captures both row- and column-level features.</a:t>
+                </a:r>
+              </a:p>
+              <a:p>
+                <a:pPr marL="0" indent="0">
+                  <a:buNone/>
+                </a:pPr>
+                <a:r>
+                  <a:rPr lang="zh-CN" altLang="en-US" dirty="0"/>
+                  <a:t>①</a:t>
+                </a:r>
+                <a:r>
+                  <a:rPr lang="en-US" altLang="zh-CN" dirty="0"/>
+                  <a:t>.project image patch features to align with text features in dimension, resulting in </a:t>
+                </a:r>
+                <a14:m>
+                  <m:oMath xmlns:m="http://schemas.openxmlformats.org/officeDocument/2006/math">
+                    <m:acc>
+                      <m:accPr>
+                        <m:chr m:val="̂"/>
+                        <m:ctrlPr>
+                          <a:rPr lang="en-US" altLang="zh-CN" i="1" smtClean="0">
+                            <a:latin typeface="Cambria Math" panose="02040503050406030204" pitchFamily="18" charset="0"/>
+                          </a:rPr>
+                        </m:ctrlPr>
+                      </m:accPr>
+                      <m:e>
+                        <m:r>
+                          <a:rPr lang="en-US" altLang="zh-CN" b="0" i="1" smtClean="0">
+                            <a:latin typeface="Cambria Math" panose="02040503050406030204" pitchFamily="18" charset="0"/>
+                          </a:rPr>
+                          <m:t>𝑃</m:t>
+                        </m:r>
+                      </m:e>
+                    </m:acc>
+                    <m:r>
+                      <a:rPr lang="en-US" altLang="zh-CN" i="1">
+                        <a:latin typeface="Cambria Math" panose="02040503050406030204" pitchFamily="18" charset="0"/>
+                        <a:ea typeface="Cambria Math" panose="02040503050406030204" pitchFamily="18" charset="0"/>
+                      </a:rPr>
+                      <m:t>𝜖</m:t>
+                    </m:r>
+                    <m:sSup>
+                      <m:sSupPr>
+                        <m:ctrlPr>
+                          <a:rPr lang="en-US" altLang="zh-CN" i="1" smtClean="0">
+                            <a:latin typeface="Cambria Math" panose="02040503050406030204" pitchFamily="18" charset="0"/>
+                            <a:ea typeface="Cambria Math" panose="02040503050406030204" pitchFamily="18" charset="0"/>
+                          </a:rPr>
+                        </m:ctrlPr>
+                      </m:sSupPr>
+                      <m:e>
+                        <m:r>
+                          <a:rPr lang="en-US" altLang="zh-CN" b="0" i="1" smtClean="0">
+                            <a:latin typeface="Cambria Math" panose="02040503050406030204" pitchFamily="18" charset="0"/>
+                            <a:ea typeface="Cambria Math" panose="02040503050406030204" pitchFamily="18" charset="0"/>
+                          </a:rPr>
+                          <m:t>𝑅</m:t>
+                        </m:r>
+                      </m:e>
+                      <m:sup>
+                        <m:r>
+                          <a:rPr lang="en-US" altLang="zh-CN" b="0" i="1" smtClean="0">
+                            <a:latin typeface="Cambria Math" panose="02040503050406030204" pitchFamily="18" charset="0"/>
+                            <a:ea typeface="Cambria Math" panose="02040503050406030204" pitchFamily="18" charset="0"/>
+                          </a:rPr>
+                          <m:t>𝐻</m:t>
+                        </m:r>
+                        <m:r>
+                          <a:rPr lang="en-US" altLang="zh-CN" b="0" i="1" smtClean="0">
+                            <a:latin typeface="Cambria Math" panose="02040503050406030204" pitchFamily="18" charset="0"/>
+                            <a:ea typeface="Cambria Math" panose="02040503050406030204" pitchFamily="18" charset="0"/>
+                          </a:rPr>
+                          <m:t>×</m:t>
+                        </m:r>
+                        <m:r>
+                          <a:rPr lang="en-US" altLang="zh-CN" b="0" i="1" smtClean="0">
+                            <a:latin typeface="Cambria Math" panose="02040503050406030204" pitchFamily="18" charset="0"/>
+                            <a:ea typeface="Cambria Math" panose="02040503050406030204" pitchFamily="18" charset="0"/>
+                          </a:rPr>
+                          <m:t>𝑊</m:t>
+                        </m:r>
+                        <m:r>
+                          <a:rPr lang="en-US" altLang="zh-CN" b="0" i="1" smtClean="0">
+                            <a:latin typeface="Cambria Math" panose="02040503050406030204" pitchFamily="18" charset="0"/>
+                            <a:ea typeface="Cambria Math" panose="02040503050406030204" pitchFamily="18" charset="0"/>
+                          </a:rPr>
+                          <m:t>×</m:t>
+                        </m:r>
+                        <m:sSub>
+                          <m:sSubPr>
+                            <m:ctrlPr>
+                              <a:rPr lang="en-US" altLang="zh-CN" b="0" i="1" smtClean="0">
+                                <a:latin typeface="Cambria Math" panose="02040503050406030204" pitchFamily="18" charset="0"/>
+                                <a:ea typeface="Cambria Math" panose="02040503050406030204" pitchFamily="18" charset="0"/>
+                              </a:rPr>
+                            </m:ctrlPr>
+                          </m:sSubPr>
+                          <m:e>
+                            <m:r>
+                              <a:rPr lang="en-US" altLang="zh-CN" b="0" i="1" smtClean="0">
+                                <a:latin typeface="Cambria Math" panose="02040503050406030204" pitchFamily="18" charset="0"/>
+                                <a:ea typeface="Cambria Math" panose="02040503050406030204" pitchFamily="18" charset="0"/>
+                              </a:rPr>
+                              <m:t>𝐶</m:t>
+                            </m:r>
+                          </m:e>
+                          <m:sub>
+                            <m:r>
+                              <a:rPr lang="en-US" altLang="zh-CN" b="0" i="1" smtClean="0">
+                                <a:latin typeface="Cambria Math" panose="02040503050406030204" pitchFamily="18" charset="0"/>
+                                <a:ea typeface="Cambria Math" panose="02040503050406030204" pitchFamily="18" charset="0"/>
+                              </a:rPr>
+                              <m:t>𝑡</m:t>
+                            </m:r>
+                          </m:sub>
+                        </m:sSub>
+                      </m:sup>
+                    </m:sSup>
+                  </m:oMath>
+                </a14:m>
+                <a:endParaRPr lang="en-US" altLang="zh-CN" dirty="0">
+                  <a:ea typeface="Cambria Math" panose="02040503050406030204" pitchFamily="18" charset="0"/>
+                </a:endParaRPr>
+              </a:p>
+              <a:p>
+                <a:pPr marL="0" indent="0">
+                  <a:buNone/>
+                </a:pPr>
+                <a:r>
+                  <a:rPr lang="zh-CN" altLang="en-US" dirty="0"/>
+                  <a:t>②</a:t>
+                </a:r>
+                <a:r>
+                  <a:rPr lang="en-US" altLang="zh-CN" dirty="0"/>
+                  <a:t>.apply two average pooling layers to extract row- and column-features from </a:t>
+                </a:r>
+                <a14:m>
+                  <m:oMath xmlns:m="http://schemas.openxmlformats.org/officeDocument/2006/math">
+                    <m:acc>
+                      <m:accPr>
+                        <m:chr m:val="̂"/>
+                        <m:ctrlPr>
+                          <a:rPr lang="en-US" altLang="zh-CN" i="1" smtClean="0">
+                            <a:latin typeface="Cambria Math" panose="02040503050406030204" pitchFamily="18" charset="0"/>
+                          </a:rPr>
+                        </m:ctrlPr>
+                      </m:accPr>
+                      <m:e>
+                        <m:r>
+                          <a:rPr lang="en-US" altLang="zh-CN" b="0" i="1" smtClean="0">
+                            <a:latin typeface="Cambria Math" panose="02040503050406030204" pitchFamily="18" charset="0"/>
+                          </a:rPr>
+                          <m:t>𝑃</m:t>
+                        </m:r>
+                      </m:e>
+                    </m:acc>
+                  </m:oMath>
+                </a14:m>
+                <a:r>
+                  <a:rPr lang="en-US" altLang="zh-CN" dirty="0"/>
+                  <a:t>.</a:t>
+                </a:r>
+              </a:p>
+              <a:p>
+                <a:pPr marL="0" indent="0" algn="ctr">
+                  <a:buNone/>
+                </a:pPr>
+                <a14:m>
+                  <m:oMathPara xmlns:m="http://schemas.openxmlformats.org/officeDocument/2006/math">
+                    <m:oMathParaPr>
+                      <m:jc m:val="centerGroup"/>
+                    </m:oMathParaPr>
+                    <m:oMath xmlns:m="http://schemas.openxmlformats.org/officeDocument/2006/math">
+                      <m:sSub>
+                        <m:sSubPr>
+                          <m:ctrlPr>
+                            <a:rPr lang="en-US" altLang="zh-CN" i="1" smtClean="0">
+                              <a:latin typeface="Cambria Math" panose="02040503050406030204" pitchFamily="18" charset="0"/>
+                            </a:rPr>
+                          </m:ctrlPr>
+                        </m:sSubPr>
+                        <m:e>
+                          <m:r>
+                            <a:rPr lang="en-US" altLang="zh-CN" b="0" i="1" smtClean="0">
+                              <a:latin typeface="Cambria Math" panose="02040503050406030204" pitchFamily="18" charset="0"/>
+                            </a:rPr>
+                            <m:t>𝑣</m:t>
+                          </m:r>
+                        </m:e>
+                        <m:sub>
+                          <m:r>
+                            <a:rPr lang="en-US" altLang="zh-CN" b="0" i="1" smtClean="0">
+                              <a:latin typeface="Cambria Math" panose="02040503050406030204" pitchFamily="18" charset="0"/>
+                            </a:rPr>
+                            <m:t>𝑟𝑜𝑤</m:t>
+                          </m:r>
+                        </m:sub>
+                      </m:sSub>
+                      <m:r>
+                        <a:rPr lang="en-US" altLang="zh-CN" b="0" i="1" smtClean="0">
+                          <a:latin typeface="Cambria Math" panose="02040503050406030204" pitchFamily="18" charset="0"/>
+                        </a:rPr>
+                        <m:t>=</m:t>
+                      </m:r>
+                      <m:sSub>
+                        <m:sSubPr>
+                          <m:ctrlPr>
+                            <a:rPr lang="en-US" altLang="zh-CN" b="0" i="1" smtClean="0">
+                              <a:latin typeface="Cambria Math" panose="02040503050406030204" pitchFamily="18" charset="0"/>
+                            </a:rPr>
+                          </m:ctrlPr>
+                        </m:sSubPr>
+                        <m:e>
+                          <m:r>
+                            <a:rPr lang="en-US" altLang="zh-CN" b="0" i="1" smtClean="0">
+                              <a:latin typeface="Cambria Math" panose="02040503050406030204" pitchFamily="18" charset="0"/>
+                            </a:rPr>
+                            <m:t>𝑐𝑜𝑛𝑣</m:t>
+                          </m:r>
+                        </m:e>
+                        <m:sub>
+                          <m:r>
+                            <a:rPr lang="en-US" altLang="zh-CN" b="0" i="1" smtClean="0">
+                              <a:latin typeface="Cambria Math" panose="02040503050406030204" pitchFamily="18" charset="0"/>
+                            </a:rPr>
+                            <m:t>1</m:t>
+                          </m:r>
+                          <m:r>
+                            <a:rPr lang="en-US" altLang="zh-CN" b="0" i="1" smtClean="0">
+                              <a:latin typeface="Cambria Math" panose="02040503050406030204" pitchFamily="18" charset="0"/>
+                              <a:ea typeface="Cambria Math" panose="02040503050406030204" pitchFamily="18" charset="0"/>
+                            </a:rPr>
+                            <m:t>×3</m:t>
+                          </m:r>
+                        </m:sub>
+                      </m:sSub>
+                      <m:r>
+                        <a:rPr lang="en-US" altLang="zh-CN" b="0" i="1" smtClean="0">
+                          <a:latin typeface="Cambria Math" panose="02040503050406030204" pitchFamily="18" charset="0"/>
+                        </a:rPr>
+                        <m:t>(</m:t>
+                      </m:r>
+                      <m:sSub>
+                        <m:sSubPr>
+                          <m:ctrlPr>
+                            <a:rPr lang="en-US" altLang="zh-CN" b="0" i="1" smtClean="0">
+                              <a:latin typeface="Cambria Math" panose="02040503050406030204" pitchFamily="18" charset="0"/>
+                            </a:rPr>
+                          </m:ctrlPr>
+                        </m:sSubPr>
+                        <m:e>
+                          <m:r>
+                            <a:rPr lang="en-US" altLang="zh-CN" b="0" i="1" smtClean="0">
+                              <a:latin typeface="Cambria Math" panose="02040503050406030204" pitchFamily="18" charset="0"/>
+                            </a:rPr>
+                            <m:t>𝐴𝑣𝑔</m:t>
+                          </m:r>
+                          <m:r>
+                            <a:rPr lang="en-US" altLang="zh-CN" b="0" i="1" smtClean="0">
+                              <a:latin typeface="Cambria Math" panose="02040503050406030204" pitchFamily="18" charset="0"/>
+                            </a:rPr>
+                            <m:t>_</m:t>
+                          </m:r>
+                          <m:r>
+                            <a:rPr lang="en-US" altLang="zh-CN" b="0" i="1" smtClean="0">
+                              <a:latin typeface="Cambria Math" panose="02040503050406030204" pitchFamily="18" charset="0"/>
+                            </a:rPr>
+                            <m:t>𝑃𝑜𝑜𝑙</m:t>
+                          </m:r>
+                        </m:e>
+                        <m:sub>
+                          <m:r>
+                            <a:rPr lang="en-US" altLang="zh-CN" b="0" i="1" smtClean="0">
+                              <a:latin typeface="Cambria Math" panose="02040503050406030204" pitchFamily="18" charset="0"/>
+                            </a:rPr>
+                            <m:t>1</m:t>
+                          </m:r>
+                          <m:r>
+                            <a:rPr lang="en-US" altLang="zh-CN" b="0" i="1" smtClean="0">
+                              <a:latin typeface="Cambria Math" panose="02040503050406030204" pitchFamily="18" charset="0"/>
+                              <a:ea typeface="Cambria Math" panose="02040503050406030204" pitchFamily="18" charset="0"/>
+                            </a:rPr>
+                            <m:t>×</m:t>
+                          </m:r>
+                          <m:r>
+                            <a:rPr lang="en-US" altLang="zh-CN" b="0" i="1" smtClean="0">
+                              <a:latin typeface="Cambria Math" panose="02040503050406030204" pitchFamily="18" charset="0"/>
+                              <a:ea typeface="Cambria Math" panose="02040503050406030204" pitchFamily="18" charset="0"/>
+                            </a:rPr>
+                            <m:t>𝑊</m:t>
+                          </m:r>
+                        </m:sub>
+                      </m:sSub>
+                      <m:r>
+                        <a:rPr lang="en-US" altLang="zh-CN" b="0" i="1" smtClean="0">
+                          <a:latin typeface="Cambria Math" panose="02040503050406030204" pitchFamily="18" charset="0"/>
+                        </a:rPr>
+                        <m:t>(</m:t>
+                      </m:r>
+                      <m:acc>
+                        <m:accPr>
+                          <m:chr m:val="̂"/>
+                          <m:ctrlPr>
+                            <a:rPr lang="en-US" altLang="zh-CN" i="1" smtClean="0">
+                              <a:latin typeface="Cambria Math" panose="02040503050406030204" pitchFamily="18" charset="0"/>
+                            </a:rPr>
+                          </m:ctrlPr>
+                        </m:accPr>
+                        <m:e>
+                          <m:r>
+                            <a:rPr lang="en-US" altLang="zh-CN" b="0" i="1" smtClean="0">
+                              <a:latin typeface="Cambria Math" panose="02040503050406030204" pitchFamily="18" charset="0"/>
+                            </a:rPr>
+                            <m:t>𝑃</m:t>
+                          </m:r>
+                        </m:e>
+                      </m:acc>
+                      <m:r>
+                        <a:rPr lang="en-US" altLang="zh-CN" b="0" i="1" smtClean="0">
+                          <a:latin typeface="Cambria Math" panose="02040503050406030204" pitchFamily="18" charset="0"/>
+                        </a:rPr>
+                        <m:t>))</m:t>
+                      </m:r>
+                    </m:oMath>
+                  </m:oMathPara>
+                </a14:m>
+                <a:endParaRPr lang="en-US" altLang="zh-CN" dirty="0"/>
+              </a:p>
+              <a:p>
+                <a:pPr marL="0" indent="0" algn="ctr">
+                  <a:buNone/>
+                </a:pPr>
+                <a14:m>
+                  <m:oMathPara xmlns:m="http://schemas.openxmlformats.org/officeDocument/2006/math">
+                    <m:oMathParaPr>
+                      <m:jc m:val="centerGroup"/>
+                    </m:oMathParaPr>
+                    <m:oMath xmlns:m="http://schemas.openxmlformats.org/officeDocument/2006/math">
+                      <m:sSub>
+                        <m:sSubPr>
+                          <m:ctrlPr>
+                            <a:rPr lang="en-US" altLang="zh-CN" i="1" smtClean="0">
+                              <a:latin typeface="Cambria Math" panose="02040503050406030204" pitchFamily="18" charset="0"/>
+                            </a:rPr>
+                          </m:ctrlPr>
+                        </m:sSubPr>
+                        <m:e>
+                          <m:r>
+                            <a:rPr lang="en-US" altLang="zh-CN" b="0" i="1" smtClean="0">
+                              <a:latin typeface="Cambria Math" panose="02040503050406030204" pitchFamily="18" charset="0"/>
+                            </a:rPr>
+                            <m:t>𝑣</m:t>
+                          </m:r>
+                        </m:e>
+                        <m:sub>
+                          <m:r>
+                            <a:rPr lang="en-US" altLang="zh-CN" b="0" i="1" smtClean="0">
+                              <a:latin typeface="Cambria Math" panose="02040503050406030204" pitchFamily="18" charset="0"/>
+                            </a:rPr>
+                            <m:t>𝑐𝑜𝑙</m:t>
+                          </m:r>
+                        </m:sub>
+                      </m:sSub>
+                      <m:r>
+                        <a:rPr lang="en-US" altLang="zh-CN" b="0" i="1" smtClean="0">
+                          <a:latin typeface="Cambria Math" panose="02040503050406030204" pitchFamily="18" charset="0"/>
+                        </a:rPr>
+                        <m:t>=</m:t>
+                      </m:r>
+                      <m:sSub>
+                        <m:sSubPr>
+                          <m:ctrlPr>
+                            <a:rPr lang="en-US" altLang="zh-CN" b="0" i="1" smtClean="0">
+                              <a:latin typeface="Cambria Math" panose="02040503050406030204" pitchFamily="18" charset="0"/>
+                            </a:rPr>
+                          </m:ctrlPr>
+                        </m:sSubPr>
+                        <m:e>
+                          <m:r>
+                            <a:rPr lang="en-US" altLang="zh-CN" b="0" i="1" smtClean="0">
+                              <a:latin typeface="Cambria Math" panose="02040503050406030204" pitchFamily="18" charset="0"/>
+                            </a:rPr>
+                            <m:t>𝑐𝑜𝑛𝑣</m:t>
+                          </m:r>
+                        </m:e>
+                        <m:sub>
+                          <m:r>
+                            <a:rPr lang="en-US" altLang="zh-CN" b="0" i="1" smtClean="0">
+                              <a:latin typeface="Cambria Math" panose="02040503050406030204" pitchFamily="18" charset="0"/>
+                            </a:rPr>
+                            <m:t>3</m:t>
+                          </m:r>
+                          <m:r>
+                            <a:rPr lang="en-US" altLang="zh-CN" b="0" i="1" smtClean="0">
+                              <a:latin typeface="Cambria Math" panose="02040503050406030204" pitchFamily="18" charset="0"/>
+                              <a:ea typeface="Cambria Math" panose="02040503050406030204" pitchFamily="18" charset="0"/>
+                            </a:rPr>
+                            <m:t>×</m:t>
+                          </m:r>
+                          <m:r>
+                            <a:rPr lang="en-US" altLang="zh-CN" b="0" i="1" smtClean="0">
+                              <a:latin typeface="Cambria Math" panose="02040503050406030204" pitchFamily="18" charset="0"/>
+                              <a:ea typeface="Cambria Math" panose="02040503050406030204" pitchFamily="18" charset="0"/>
+                            </a:rPr>
+                            <m:t>1</m:t>
+                          </m:r>
+                        </m:sub>
+                      </m:sSub>
+                      <m:r>
+                        <a:rPr lang="en-US" altLang="zh-CN" b="0" i="1" smtClean="0">
+                          <a:latin typeface="Cambria Math" panose="02040503050406030204" pitchFamily="18" charset="0"/>
+                        </a:rPr>
+                        <m:t>(</m:t>
+                      </m:r>
+                      <m:sSub>
+                        <m:sSubPr>
+                          <m:ctrlPr>
+                            <a:rPr lang="en-US" altLang="zh-CN" b="0" i="1" smtClean="0">
+                              <a:latin typeface="Cambria Math" panose="02040503050406030204" pitchFamily="18" charset="0"/>
+                            </a:rPr>
+                          </m:ctrlPr>
+                        </m:sSubPr>
+                        <m:e>
+                          <m:r>
+                            <a:rPr lang="en-US" altLang="zh-CN" b="0" i="1" smtClean="0">
+                              <a:latin typeface="Cambria Math" panose="02040503050406030204" pitchFamily="18" charset="0"/>
+                            </a:rPr>
+                            <m:t>𝐴𝑣𝑔</m:t>
+                          </m:r>
+                          <m:r>
+                            <a:rPr lang="en-US" altLang="zh-CN" b="0" i="1" smtClean="0">
+                              <a:latin typeface="Cambria Math" panose="02040503050406030204" pitchFamily="18" charset="0"/>
+                            </a:rPr>
+                            <m:t>_</m:t>
+                          </m:r>
+                          <m:r>
+                            <a:rPr lang="en-US" altLang="zh-CN" b="0" i="1" smtClean="0">
+                              <a:latin typeface="Cambria Math" panose="02040503050406030204" pitchFamily="18" charset="0"/>
+                            </a:rPr>
+                            <m:t>𝑃𝑜𝑜𝑙</m:t>
+                          </m:r>
+                        </m:e>
+                        <m:sub>
+                          <m:r>
+                            <a:rPr lang="en-US" altLang="zh-CN" b="0" i="1" smtClean="0">
+                              <a:latin typeface="Cambria Math" panose="02040503050406030204" pitchFamily="18" charset="0"/>
+                            </a:rPr>
+                            <m:t>𝐻</m:t>
+                          </m:r>
+                          <m:r>
+                            <a:rPr lang="en-US" altLang="zh-CN" b="0" i="1" smtClean="0">
+                              <a:latin typeface="Cambria Math" panose="02040503050406030204" pitchFamily="18" charset="0"/>
+                              <a:ea typeface="Cambria Math" panose="02040503050406030204" pitchFamily="18" charset="0"/>
+                            </a:rPr>
+                            <m:t>×</m:t>
+                          </m:r>
+                          <m:r>
+                            <a:rPr lang="en-US" altLang="zh-CN" b="0" i="1" smtClean="0">
+                              <a:latin typeface="Cambria Math" panose="02040503050406030204" pitchFamily="18" charset="0"/>
+                              <a:ea typeface="Cambria Math" panose="02040503050406030204" pitchFamily="18" charset="0"/>
+                            </a:rPr>
+                            <m:t>1</m:t>
+                          </m:r>
+                        </m:sub>
+                      </m:sSub>
+                      <m:r>
+                        <a:rPr lang="en-US" altLang="zh-CN" b="0" i="1" smtClean="0">
+                          <a:latin typeface="Cambria Math" panose="02040503050406030204" pitchFamily="18" charset="0"/>
+                        </a:rPr>
+                        <m:t>(</m:t>
+                      </m:r>
+                      <m:acc>
+                        <m:accPr>
+                          <m:chr m:val="̂"/>
+                          <m:ctrlPr>
+                            <a:rPr lang="en-US" altLang="zh-CN" i="1" smtClean="0">
+                              <a:latin typeface="Cambria Math" panose="02040503050406030204" pitchFamily="18" charset="0"/>
+                            </a:rPr>
+                          </m:ctrlPr>
+                        </m:accPr>
+                        <m:e>
+                          <m:r>
+                            <a:rPr lang="en-US" altLang="zh-CN" b="0" i="1" smtClean="0">
+                              <a:latin typeface="Cambria Math" panose="02040503050406030204" pitchFamily="18" charset="0"/>
+                            </a:rPr>
+                            <m:t>𝑃</m:t>
+                          </m:r>
+                        </m:e>
+                      </m:acc>
+                      <m:r>
+                        <a:rPr lang="en-US" altLang="zh-CN" b="0" i="1" smtClean="0">
+                          <a:latin typeface="Cambria Math" panose="02040503050406030204" pitchFamily="18" charset="0"/>
+                        </a:rPr>
+                        <m:t>))</m:t>
+                      </m:r>
+                    </m:oMath>
+                  </m:oMathPara>
+                </a14:m>
+                <a:endParaRPr lang="en-US" altLang="zh-CN" dirty="0"/>
+              </a:p>
+              <a:p>
+                <a:pPr marL="0" indent="0">
+                  <a:buNone/>
+                </a:pPr>
+                <a:r>
+                  <a:rPr lang="en-US" altLang="zh-CN" dirty="0"/>
+                  <a:t>where </a:t>
+                </a:r>
+                <a14:m>
+                  <m:oMath xmlns:m="http://schemas.openxmlformats.org/officeDocument/2006/math">
+                    <m:sSub>
+                      <m:sSubPr>
+                        <m:ctrlPr>
+                          <a:rPr lang="en-US" altLang="zh-CN" i="1" smtClean="0">
+                            <a:latin typeface="Cambria Math" panose="02040503050406030204" pitchFamily="18" charset="0"/>
+                          </a:rPr>
+                        </m:ctrlPr>
+                      </m:sSubPr>
+                      <m:e>
+                        <m:r>
+                          <a:rPr lang="en-US" altLang="zh-CN" b="0" i="1" smtClean="0">
+                            <a:latin typeface="Cambria Math" panose="02040503050406030204" pitchFamily="18" charset="0"/>
+                          </a:rPr>
+                          <m:t>𝑣</m:t>
+                        </m:r>
+                      </m:e>
+                      <m:sub>
+                        <m:r>
+                          <a:rPr lang="en-US" altLang="zh-CN" b="0" i="1" smtClean="0">
+                            <a:latin typeface="Cambria Math" panose="02040503050406030204" pitchFamily="18" charset="0"/>
+                          </a:rPr>
+                          <m:t>𝑟𝑜𝑤</m:t>
+                        </m:r>
+                      </m:sub>
+                    </m:sSub>
+                    <m:r>
+                      <a:rPr lang="en-US" altLang="zh-CN" b="0" i="1" smtClean="0">
+                        <a:latin typeface="Cambria Math" panose="02040503050406030204" pitchFamily="18" charset="0"/>
+                        <a:ea typeface="Cambria Math" panose="02040503050406030204" pitchFamily="18" charset="0"/>
+                      </a:rPr>
+                      <m:t>∈</m:t>
+                    </m:r>
+                    <m:sSup>
+                      <m:sSupPr>
+                        <m:ctrlPr>
+                          <a:rPr lang="en-US" altLang="zh-CN" i="1" smtClean="0">
+                            <a:latin typeface="Cambria Math" panose="02040503050406030204" pitchFamily="18" charset="0"/>
+                            <a:ea typeface="Cambria Math" panose="02040503050406030204" pitchFamily="18" charset="0"/>
+                          </a:rPr>
+                        </m:ctrlPr>
+                      </m:sSupPr>
+                      <m:e>
+                        <m:r>
+                          <a:rPr lang="en-US" altLang="zh-CN" b="0" i="1" smtClean="0">
+                            <a:latin typeface="Cambria Math" panose="02040503050406030204" pitchFamily="18" charset="0"/>
+                            <a:ea typeface="Cambria Math" panose="02040503050406030204" pitchFamily="18" charset="0"/>
+                          </a:rPr>
+                          <m:t>𝑅</m:t>
+                        </m:r>
+                      </m:e>
+                      <m:sup>
+                        <m:r>
+                          <a:rPr lang="en-US" altLang="zh-CN" b="0" i="1" smtClean="0">
+                            <a:latin typeface="Cambria Math" panose="02040503050406030204" pitchFamily="18" charset="0"/>
+                            <a:ea typeface="Cambria Math" panose="02040503050406030204" pitchFamily="18" charset="0"/>
+                          </a:rPr>
+                          <m:t>𝐻</m:t>
+                        </m:r>
+                        <m:r>
+                          <a:rPr lang="en-US" altLang="zh-CN" b="0" i="1" smtClean="0">
+                            <a:latin typeface="Cambria Math" panose="02040503050406030204" pitchFamily="18" charset="0"/>
+                            <a:ea typeface="Cambria Math" panose="02040503050406030204" pitchFamily="18" charset="0"/>
+                          </a:rPr>
+                          <m:t>×</m:t>
+                        </m:r>
+                        <m:sSub>
+                          <m:sSubPr>
+                            <m:ctrlPr>
+                              <a:rPr lang="en-US" altLang="zh-CN" b="0" i="1" smtClean="0">
+                                <a:latin typeface="Cambria Math" panose="02040503050406030204" pitchFamily="18" charset="0"/>
+                                <a:ea typeface="Cambria Math" panose="02040503050406030204" pitchFamily="18" charset="0"/>
+                              </a:rPr>
+                            </m:ctrlPr>
+                          </m:sSubPr>
+                          <m:e>
+                            <m:r>
+                              <a:rPr lang="en-US" altLang="zh-CN" b="0" i="1" smtClean="0">
+                                <a:latin typeface="Cambria Math" panose="02040503050406030204" pitchFamily="18" charset="0"/>
+                                <a:ea typeface="Cambria Math" panose="02040503050406030204" pitchFamily="18" charset="0"/>
+                              </a:rPr>
+                              <m:t>𝐶</m:t>
+                            </m:r>
+                          </m:e>
+                          <m:sub>
+                            <m:r>
+                              <a:rPr lang="en-US" altLang="zh-CN" b="0" i="1" smtClean="0">
+                                <a:latin typeface="Cambria Math" panose="02040503050406030204" pitchFamily="18" charset="0"/>
+                                <a:ea typeface="Cambria Math" panose="02040503050406030204" pitchFamily="18" charset="0"/>
+                              </a:rPr>
+                              <m:t>h</m:t>
+                            </m:r>
+                          </m:sub>
+                        </m:sSub>
+                      </m:sup>
+                    </m:sSup>
+                  </m:oMath>
+                </a14:m>
+                <a:r>
+                  <a:rPr lang="en-US" altLang="zh-CN" dirty="0"/>
+                  <a:t> and </a:t>
+                </a:r>
+                <a14:m>
+                  <m:oMath xmlns:m="http://schemas.openxmlformats.org/officeDocument/2006/math">
+                    <m:sSub>
+                      <m:sSubPr>
+                        <m:ctrlPr>
+                          <a:rPr lang="en-US" altLang="zh-CN" i="1" smtClean="0">
+                            <a:latin typeface="Cambria Math" panose="02040503050406030204" pitchFamily="18" charset="0"/>
+                          </a:rPr>
+                        </m:ctrlPr>
+                      </m:sSubPr>
+                      <m:e>
+                        <m:r>
+                          <a:rPr lang="en-US" altLang="zh-CN" b="0" i="1" smtClean="0">
+                            <a:latin typeface="Cambria Math" panose="02040503050406030204" pitchFamily="18" charset="0"/>
+                          </a:rPr>
+                          <m:t>𝑣</m:t>
+                        </m:r>
+                      </m:e>
+                      <m:sub>
+                        <m:r>
+                          <a:rPr lang="en-US" altLang="zh-CN" b="0" i="1" smtClean="0">
+                            <a:latin typeface="Cambria Math" panose="02040503050406030204" pitchFamily="18" charset="0"/>
+                          </a:rPr>
+                          <m:t>𝑐𝑜𝑙</m:t>
+                        </m:r>
+                      </m:sub>
+                    </m:sSub>
+                    <m:r>
+                      <a:rPr lang="en-US" altLang="zh-CN" b="0" i="1" smtClean="0">
+                        <a:latin typeface="Cambria Math" panose="02040503050406030204" pitchFamily="18" charset="0"/>
+                        <a:ea typeface="Cambria Math" panose="02040503050406030204" pitchFamily="18" charset="0"/>
+                      </a:rPr>
+                      <m:t>∈</m:t>
+                    </m:r>
+                    <m:sSup>
+                      <m:sSupPr>
+                        <m:ctrlPr>
+                          <a:rPr lang="en-US" altLang="zh-CN" i="1" smtClean="0">
+                            <a:latin typeface="Cambria Math" panose="02040503050406030204" pitchFamily="18" charset="0"/>
+                            <a:ea typeface="Cambria Math" panose="02040503050406030204" pitchFamily="18" charset="0"/>
+                          </a:rPr>
+                        </m:ctrlPr>
+                      </m:sSupPr>
+                      <m:e>
+                        <m:r>
+                          <a:rPr lang="en-US" altLang="zh-CN" b="0" i="1" smtClean="0">
+                            <a:latin typeface="Cambria Math" panose="02040503050406030204" pitchFamily="18" charset="0"/>
+                            <a:ea typeface="Cambria Math" panose="02040503050406030204" pitchFamily="18" charset="0"/>
+                          </a:rPr>
+                          <m:t>𝑅</m:t>
+                        </m:r>
+                      </m:e>
+                      <m:sup>
+                        <m:r>
+                          <a:rPr lang="en-US" altLang="zh-CN" b="0" i="1" smtClean="0">
+                            <a:latin typeface="Cambria Math" panose="02040503050406030204" pitchFamily="18" charset="0"/>
+                            <a:ea typeface="Cambria Math" panose="02040503050406030204" pitchFamily="18" charset="0"/>
+                          </a:rPr>
+                          <m:t>𝑊</m:t>
+                        </m:r>
+                        <m:r>
+                          <a:rPr lang="en-US" altLang="zh-CN" b="0" i="1" smtClean="0">
+                            <a:latin typeface="Cambria Math" panose="02040503050406030204" pitchFamily="18" charset="0"/>
+                            <a:ea typeface="Cambria Math" panose="02040503050406030204" pitchFamily="18" charset="0"/>
+                          </a:rPr>
+                          <m:t>×</m:t>
+                        </m:r>
+                        <m:sSub>
+                          <m:sSubPr>
+                            <m:ctrlPr>
+                              <a:rPr lang="en-US" altLang="zh-CN" b="0" i="1" smtClean="0">
+                                <a:latin typeface="Cambria Math" panose="02040503050406030204" pitchFamily="18" charset="0"/>
+                                <a:ea typeface="Cambria Math" panose="02040503050406030204" pitchFamily="18" charset="0"/>
+                              </a:rPr>
+                            </m:ctrlPr>
+                          </m:sSubPr>
+                          <m:e>
+                            <m:r>
+                              <a:rPr lang="en-US" altLang="zh-CN" b="0" i="1" smtClean="0">
+                                <a:latin typeface="Cambria Math" panose="02040503050406030204" pitchFamily="18" charset="0"/>
+                                <a:ea typeface="Cambria Math" panose="02040503050406030204" pitchFamily="18" charset="0"/>
+                              </a:rPr>
+                              <m:t>𝐶</m:t>
+                            </m:r>
+                          </m:e>
+                          <m:sub>
+                            <m:r>
+                              <a:rPr lang="en-US" altLang="zh-CN" b="0" i="1" smtClean="0">
+                                <a:latin typeface="Cambria Math" panose="02040503050406030204" pitchFamily="18" charset="0"/>
+                                <a:ea typeface="Cambria Math" panose="02040503050406030204" pitchFamily="18" charset="0"/>
+                              </a:rPr>
+                              <m:t>h</m:t>
+                            </m:r>
+                          </m:sub>
+                        </m:sSub>
+                      </m:sup>
+                    </m:sSup>
+                  </m:oMath>
+                </a14:m>
+                <a:r>
+                  <a:rPr lang="en-US" altLang="zh-CN" dirty="0"/>
+                  <a:t> are raw- and column-level features.</a:t>
+                </a:r>
+              </a:p>
+            </p:txBody>
+          </p:sp>
+        </mc:Choice>
+        <mc:Fallback>
+          <p:sp>
+            <p:nvSpPr>
+              <p:cNvPr id="5" name="内容占位符 4">
+                <a:extLst>
+                  <a:ext uri="{FF2B5EF4-FFF2-40B4-BE49-F238E27FC236}">
+                    <a16:creationId xmlns:a16="http://schemas.microsoft.com/office/drawing/2014/main" id="{7CCA9E6E-8FDB-96E0-EBA0-9DCC32D45C7A}"/>
+                  </a:ext>
+                </a:extLst>
+              </p:cNvPr>
+              <p:cNvSpPr>
+                <a:spLocks noGrp="1" noRot="1" noChangeAspect="1" noMove="1" noResize="1" noEditPoints="1" noAdjustHandles="1" noChangeArrowheads="1" noChangeShapeType="1" noTextEdit="1"/>
+              </p:cNvSpPr>
+              <p:nvPr>
+                <p:ph idx="1"/>
+              </p:nvPr>
+            </p:nvSpPr>
+            <p:spPr>
+              <a:xfrm>
+                <a:off x="3447535" y="0"/>
+                <a:ext cx="8744465" cy="6857999"/>
+              </a:xfrm>
+              <a:blipFill>
+                <a:blip r:embed="rId2"/>
+                <a:stretch>
+                  <a:fillRect l="-1813" t="-1867" r="-2510"/>
+                </a:stretch>
+              </a:blipFill>
+            </p:spPr>
+            <p:txBody>
+              <a:bodyPr/>
+              <a:lstStyle/>
+              <a:p>
+                <a:r>
+                  <a:rPr lang="zh-CN" altLang="en-US">
+                    <a:noFill/>
+                  </a:rPr>
+                  <a:t> </a:t>
+                </a:r>
+              </a:p>
+            </p:txBody>
+          </p:sp>
+        </mc:Fallback>
+      </mc:AlternateContent>
+    </p:spTree>
+    <p:extLst>
+      <p:ext uri="{BB962C8B-B14F-4D97-AF65-F5344CB8AC3E}">
+        <p14:creationId xmlns:p14="http://schemas.microsoft.com/office/powerpoint/2010/main" val="3057393935"/>
+      </p:ext>
+    </p:extLst>
+  </p:cSld>
+  <p:clrMapOvr>
+    <a:masterClrMapping/>
+  </p:clrMapOvr>
+</p:sld>
+</file>
+
 <file path=ppt/slides/slide2.xml><?xml version="1.0" encoding="utf-8"?>
 <p:sld xmlns:a="http://schemas.openxmlformats.org/drawingml/2006/main" xmlns:r="http://schemas.openxmlformats.org/officeDocument/2006/relationships" xmlns:p="http://schemas.openxmlformats.org/presentationml/2006/main">
   <p:cSld>
@@ -3800,11 +5073,7 @@
             </a:pPr>
             <a:r>
               <a:rPr lang="en-US" altLang="zh-CN" dirty="0"/>
-              <a:t>(2).SAM has a strong segmentation capability and can accept diverse prompts, including points, boxes, and text prompts. but the ambiguous prompts lead to the generation </a:t>
-            </a:r>
-            <a:r>
-              <a:rPr lang="en-US" altLang="zh-CN"/>
-              <a:t>of redundant masks.</a:t>
+              <a:t>(2).SAM has a strong segmentation capability and can accept diverse prompts, including points, boxes, and text prompts. but the ambiguous prompts lead to the generation of redundant masks.</a:t>
             </a:r>
             <a:endParaRPr lang="zh-CN" altLang="en-US" dirty="0"/>
           </a:p>
@@ -3814,6 +5083,760 @@
     <p:extLst>
       <p:ext uri="{BB962C8B-B14F-4D97-AF65-F5344CB8AC3E}">
         <p14:creationId xmlns:p14="http://schemas.microsoft.com/office/powerpoint/2010/main" val="1728148269"/>
+      </p:ext>
+    </p:extLst>
+  </p:cSld>
+  <p:clrMapOvr>
+    <a:masterClrMapping/>
+  </p:clrMapOvr>
+</p:sld>
+</file>
+
+<file path=ppt/slides/slide5.xml><?xml version="1.0" encoding="utf-8"?>
+<p:sld xmlns:a="http://schemas.openxmlformats.org/drawingml/2006/main" xmlns:r="http://schemas.openxmlformats.org/officeDocument/2006/relationships" xmlns:p="http://schemas.openxmlformats.org/presentationml/2006/main">
+  <p:cSld>
+    <p:spTree>
+      <p:nvGrpSpPr>
+        <p:cNvPr id="1" name=""/>
+        <p:cNvGrpSpPr/>
+        <p:nvPr/>
+      </p:nvGrpSpPr>
+      <p:grpSpPr>
+        <a:xfrm>
+          <a:off x="0" y="0"/>
+          <a:ext cx="0" cy="0"/>
+          <a:chOff x="0" y="0"/>
+          <a:chExt cx="0" cy="0"/>
+        </a:xfrm>
+      </p:grpSpPr>
+      <p:sp>
+        <p:nvSpPr>
+          <p:cNvPr id="2" name="标题 1">
+            <a:extLst>
+              <a:ext uri="{FF2B5EF4-FFF2-40B4-BE49-F238E27FC236}">
+                <a16:creationId xmlns:a16="http://schemas.microsoft.com/office/drawing/2014/main" id="{1E0D5EC2-00ED-9028-F983-B2BCDD46ACA5}"/>
+              </a:ext>
+            </a:extLst>
+          </p:cNvPr>
+          <p:cNvSpPr>
+            <a:spLocks noGrp="1"/>
+          </p:cNvSpPr>
+          <p:nvPr>
+            <p:ph type="title"/>
+          </p:nvPr>
+        </p:nvSpPr>
+        <p:spPr/>
+        <p:txBody>
+          <a:bodyPr/>
+          <a:lstStyle/>
+          <a:p>
+            <a:r>
+              <a:rPr lang="en-US" altLang="zh-CN" dirty="0"/>
+              <a:t>1.Introduction</a:t>
+            </a:r>
+            <a:endParaRPr lang="zh-CN" altLang="en-US" dirty="0"/>
+          </a:p>
+        </p:txBody>
+      </p:sp>
+      <p:sp>
+        <p:nvSpPr>
+          <p:cNvPr id="3" name="内容占位符 2">
+            <a:extLst>
+              <a:ext uri="{FF2B5EF4-FFF2-40B4-BE49-F238E27FC236}">
+                <a16:creationId xmlns:a16="http://schemas.microsoft.com/office/drawing/2014/main" id="{014F826C-18EE-CFFF-7554-BAB15F60878C}"/>
+              </a:ext>
+            </a:extLst>
+          </p:cNvPr>
+          <p:cNvSpPr>
+            <a:spLocks noGrp="1"/>
+          </p:cNvSpPr>
+          <p:nvPr>
+            <p:ph idx="1"/>
+          </p:nvPr>
+        </p:nvSpPr>
+        <p:spPr/>
+        <p:txBody>
+          <a:bodyPr/>
+          <a:lstStyle/>
+          <a:p>
+            <a:r>
+              <a:rPr lang="en-US" altLang="zh-CN" dirty="0"/>
+              <a:t>base on the observations – we design a two-stage framework</a:t>
+            </a:r>
+          </a:p>
+          <a:p>
+            <a:pPr marL="0" indent="0">
+              <a:buNone/>
+            </a:pPr>
+            <a:r>
+              <a:rPr lang="en-US" altLang="zh-CN" dirty="0"/>
+              <a:t>(1).In the first stage, we employ CLIP for rough segmentation. In this part, we design a UMCI model to fusion multi-model features at different level.</a:t>
+            </a:r>
+          </a:p>
+          <a:p>
+            <a:pPr marL="0" indent="0">
+              <a:buNone/>
+            </a:pPr>
+            <a:r>
+              <a:rPr lang="en-US" altLang="zh-CN" dirty="0"/>
+              <a:t>(2).In the second stage, we use CLIP’s localization information to guide SAM for segmentation refinement. In this part, we propose a MMR module: use CLIP localization information to generate precise masks, and then fuse it with CLIP result.</a:t>
+            </a:r>
+            <a:endParaRPr lang="zh-CN" altLang="en-US" dirty="0"/>
+          </a:p>
+        </p:txBody>
+      </p:sp>
+    </p:spTree>
+    <p:extLst>
+      <p:ext uri="{BB962C8B-B14F-4D97-AF65-F5344CB8AC3E}">
+        <p14:creationId xmlns:p14="http://schemas.microsoft.com/office/powerpoint/2010/main" val="3343781084"/>
+      </p:ext>
+    </p:extLst>
+  </p:cSld>
+  <p:clrMapOvr>
+    <a:masterClrMapping/>
+  </p:clrMapOvr>
+</p:sld>
+</file>
+
+<file path=ppt/slides/slide6.xml><?xml version="1.0" encoding="utf-8"?>
+<p:sld xmlns:a="http://schemas.openxmlformats.org/drawingml/2006/main" xmlns:r="http://schemas.openxmlformats.org/officeDocument/2006/relationships" xmlns:p="http://schemas.openxmlformats.org/presentationml/2006/main">
+  <p:cSld>
+    <p:spTree>
+      <p:nvGrpSpPr>
+        <p:cNvPr id="1" name=""/>
+        <p:cNvGrpSpPr/>
+        <p:nvPr/>
+      </p:nvGrpSpPr>
+      <p:grpSpPr>
+        <a:xfrm>
+          <a:off x="0" y="0"/>
+          <a:ext cx="0" cy="0"/>
+          <a:chOff x="0" y="0"/>
+          <a:chExt cx="0" cy="0"/>
+        </a:xfrm>
+      </p:grpSpPr>
+      <p:sp>
+        <p:nvSpPr>
+          <p:cNvPr id="2" name="标题 1">
+            <a:extLst>
+              <a:ext uri="{FF2B5EF4-FFF2-40B4-BE49-F238E27FC236}">
+                <a16:creationId xmlns:a16="http://schemas.microsoft.com/office/drawing/2014/main" id="{20618421-B59A-AC9B-4C2B-A4D78327CE22}"/>
+              </a:ext>
+            </a:extLst>
+          </p:cNvPr>
+          <p:cNvSpPr>
+            <a:spLocks noGrp="1"/>
+          </p:cNvSpPr>
+          <p:nvPr>
+            <p:ph type="title"/>
+          </p:nvPr>
+        </p:nvSpPr>
+        <p:spPr>
+          <a:xfrm>
+            <a:off x="61313" y="457200"/>
+            <a:ext cx="3546860" cy="1600200"/>
+          </a:xfrm>
+        </p:spPr>
+        <p:txBody>
+          <a:bodyPr/>
+          <a:lstStyle/>
+          <a:p>
+            <a:r>
+              <a:rPr lang="en-US" altLang="zh-CN" dirty="0"/>
+              <a:t>2.Related Work</a:t>
+            </a:r>
+            <a:endParaRPr lang="zh-CN" altLang="en-US" dirty="0"/>
+          </a:p>
+        </p:txBody>
+      </p:sp>
+      <p:sp>
+        <p:nvSpPr>
+          <p:cNvPr id="3" name="内容占位符 2">
+            <a:extLst>
+              <a:ext uri="{FF2B5EF4-FFF2-40B4-BE49-F238E27FC236}">
+                <a16:creationId xmlns:a16="http://schemas.microsoft.com/office/drawing/2014/main" id="{ECBC0E2A-1B83-D774-9B95-798C9BE1E79B}"/>
+              </a:ext>
+            </a:extLst>
+          </p:cNvPr>
+          <p:cNvSpPr>
+            <a:spLocks noGrp="1"/>
+          </p:cNvSpPr>
+          <p:nvPr>
+            <p:ph idx="1"/>
+          </p:nvPr>
+        </p:nvSpPr>
+        <p:spPr>
+          <a:xfrm>
+            <a:off x="3694670" y="0"/>
+            <a:ext cx="8497330" cy="6857999"/>
+          </a:xfrm>
+        </p:spPr>
+        <p:txBody>
+          <a:bodyPr/>
+          <a:lstStyle/>
+          <a:p>
+            <a:r>
+              <a:rPr lang="en-US" altLang="zh-CN" dirty="0"/>
+              <a:t>nothing to tell</a:t>
+            </a:r>
+            <a:endParaRPr lang="zh-CN" altLang="en-US" dirty="0"/>
+          </a:p>
+        </p:txBody>
+      </p:sp>
+      <p:sp>
+        <p:nvSpPr>
+          <p:cNvPr id="4" name="文本占位符 3">
+            <a:extLst>
+              <a:ext uri="{FF2B5EF4-FFF2-40B4-BE49-F238E27FC236}">
+                <a16:creationId xmlns:a16="http://schemas.microsoft.com/office/drawing/2014/main" id="{351E9848-A693-DC47-CE0F-2FA538003518}"/>
+              </a:ext>
+            </a:extLst>
+          </p:cNvPr>
+          <p:cNvSpPr>
+            <a:spLocks noGrp="1"/>
+          </p:cNvSpPr>
+          <p:nvPr>
+            <p:ph type="body" sz="half" idx="2"/>
+          </p:nvPr>
+        </p:nvSpPr>
+        <p:spPr>
+          <a:xfrm>
+            <a:off x="61312" y="2057400"/>
+            <a:ext cx="3546861" cy="3811588"/>
+          </a:xfrm>
+        </p:spPr>
+        <p:txBody>
+          <a:bodyPr/>
+          <a:lstStyle/>
+          <a:p>
+            <a:r>
+              <a:rPr lang="en-US" altLang="zh-CN" dirty="0"/>
+              <a:t>2.1 </a:t>
+            </a:r>
+            <a:r>
+              <a:rPr lang="en-US" altLang="zh-CN" dirty="0">
+                <a:highlight>
+                  <a:srgbClr val="FFFF00"/>
+                </a:highlight>
+              </a:rPr>
+              <a:t>Zero-shot Anomaly Segmentation</a:t>
+            </a:r>
+          </a:p>
+          <a:p>
+            <a:r>
+              <a:rPr lang="en-US" altLang="zh-CN" dirty="0"/>
+              <a:t>2.2 Foundation Models</a:t>
+            </a:r>
+          </a:p>
+          <a:p>
+            <a:r>
+              <a:rPr lang="en-US" altLang="zh-CN" dirty="0"/>
+              <a:t>2.3 Cross-modal Interaction</a:t>
+            </a:r>
+            <a:endParaRPr lang="zh-CN" altLang="en-US" dirty="0"/>
+          </a:p>
+        </p:txBody>
+      </p:sp>
+    </p:spTree>
+    <p:extLst>
+      <p:ext uri="{BB962C8B-B14F-4D97-AF65-F5344CB8AC3E}">
+        <p14:creationId xmlns:p14="http://schemas.microsoft.com/office/powerpoint/2010/main" val="2785888387"/>
+      </p:ext>
+    </p:extLst>
+  </p:cSld>
+  <p:clrMapOvr>
+    <a:masterClrMapping/>
+  </p:clrMapOvr>
+</p:sld>
+</file>
+
+<file path=ppt/slides/slide7.xml><?xml version="1.0" encoding="utf-8"?>
+<p:sld xmlns:a="http://schemas.openxmlformats.org/drawingml/2006/main" xmlns:r="http://schemas.openxmlformats.org/officeDocument/2006/relationships" xmlns:p="http://schemas.openxmlformats.org/presentationml/2006/main">
+  <p:cSld>
+    <p:spTree>
+      <p:nvGrpSpPr>
+        <p:cNvPr id="1" name=""/>
+        <p:cNvGrpSpPr/>
+        <p:nvPr/>
+      </p:nvGrpSpPr>
+      <p:grpSpPr>
+        <a:xfrm>
+          <a:off x="0" y="0"/>
+          <a:ext cx="0" cy="0"/>
+          <a:chOff x="0" y="0"/>
+          <a:chExt cx="0" cy="0"/>
+        </a:xfrm>
+      </p:grpSpPr>
+      <p:sp>
+        <p:nvSpPr>
+          <p:cNvPr id="2" name="标题 1">
+            <a:extLst>
+              <a:ext uri="{FF2B5EF4-FFF2-40B4-BE49-F238E27FC236}">
+                <a16:creationId xmlns:a16="http://schemas.microsoft.com/office/drawing/2014/main" id="{20618421-B59A-AC9B-4C2B-A4D78327CE22}"/>
+              </a:ext>
+            </a:extLst>
+          </p:cNvPr>
+          <p:cNvSpPr>
+            <a:spLocks noGrp="1"/>
+          </p:cNvSpPr>
+          <p:nvPr>
+            <p:ph type="title"/>
+          </p:nvPr>
+        </p:nvSpPr>
+        <p:spPr>
+          <a:xfrm>
+            <a:off x="61313" y="457200"/>
+            <a:ext cx="3546860" cy="1600200"/>
+          </a:xfrm>
+        </p:spPr>
+        <p:txBody>
+          <a:bodyPr/>
+          <a:lstStyle/>
+          <a:p>
+            <a:r>
+              <a:rPr lang="en-US" altLang="zh-CN" dirty="0"/>
+              <a:t>2.Related Work</a:t>
+            </a:r>
+            <a:endParaRPr lang="zh-CN" altLang="en-US" dirty="0"/>
+          </a:p>
+        </p:txBody>
+      </p:sp>
+      <p:sp>
+        <p:nvSpPr>
+          <p:cNvPr id="3" name="内容占位符 2">
+            <a:extLst>
+              <a:ext uri="{FF2B5EF4-FFF2-40B4-BE49-F238E27FC236}">
+                <a16:creationId xmlns:a16="http://schemas.microsoft.com/office/drawing/2014/main" id="{ECBC0E2A-1B83-D774-9B95-798C9BE1E79B}"/>
+              </a:ext>
+            </a:extLst>
+          </p:cNvPr>
+          <p:cNvSpPr>
+            <a:spLocks noGrp="1"/>
+          </p:cNvSpPr>
+          <p:nvPr>
+            <p:ph idx="1"/>
+          </p:nvPr>
+        </p:nvSpPr>
+        <p:spPr>
+          <a:xfrm>
+            <a:off x="3694670" y="0"/>
+            <a:ext cx="8497330" cy="6857999"/>
+          </a:xfrm>
+        </p:spPr>
+        <p:txBody>
+          <a:bodyPr/>
+          <a:lstStyle/>
+          <a:p>
+            <a:r>
+              <a:rPr lang="en-US" altLang="zh-CN" dirty="0"/>
+              <a:t>nothing to tell</a:t>
+            </a:r>
+            <a:endParaRPr lang="zh-CN" altLang="en-US" dirty="0"/>
+          </a:p>
+        </p:txBody>
+      </p:sp>
+      <p:sp>
+        <p:nvSpPr>
+          <p:cNvPr id="4" name="文本占位符 3">
+            <a:extLst>
+              <a:ext uri="{FF2B5EF4-FFF2-40B4-BE49-F238E27FC236}">
+                <a16:creationId xmlns:a16="http://schemas.microsoft.com/office/drawing/2014/main" id="{351E9848-A693-DC47-CE0F-2FA538003518}"/>
+              </a:ext>
+            </a:extLst>
+          </p:cNvPr>
+          <p:cNvSpPr>
+            <a:spLocks noGrp="1"/>
+          </p:cNvSpPr>
+          <p:nvPr>
+            <p:ph type="body" sz="half" idx="2"/>
+          </p:nvPr>
+        </p:nvSpPr>
+        <p:spPr>
+          <a:xfrm>
+            <a:off x="61312" y="2057400"/>
+            <a:ext cx="3546861" cy="3811588"/>
+          </a:xfrm>
+        </p:spPr>
+        <p:txBody>
+          <a:bodyPr/>
+          <a:lstStyle/>
+          <a:p>
+            <a:r>
+              <a:rPr lang="en-US" altLang="zh-CN" dirty="0"/>
+              <a:t>2.1 Zero-shot Anomaly Segmentation</a:t>
+            </a:r>
+          </a:p>
+          <a:p>
+            <a:r>
+              <a:rPr lang="en-US" altLang="zh-CN" dirty="0"/>
+              <a:t>2.2 </a:t>
+            </a:r>
+            <a:r>
+              <a:rPr lang="en-US" altLang="zh-CN" dirty="0">
+                <a:highlight>
+                  <a:srgbClr val="FFFF00"/>
+                </a:highlight>
+              </a:rPr>
+              <a:t>Foundation Models</a:t>
+            </a:r>
+          </a:p>
+          <a:p>
+            <a:r>
+              <a:rPr lang="en-US" altLang="zh-CN" dirty="0"/>
+              <a:t>2.3 Cross-modal Interaction</a:t>
+            </a:r>
+            <a:endParaRPr lang="zh-CN" altLang="en-US" dirty="0"/>
+          </a:p>
+        </p:txBody>
+      </p:sp>
+    </p:spTree>
+    <p:extLst>
+      <p:ext uri="{BB962C8B-B14F-4D97-AF65-F5344CB8AC3E}">
+        <p14:creationId xmlns:p14="http://schemas.microsoft.com/office/powerpoint/2010/main" val="862370994"/>
+      </p:ext>
+    </p:extLst>
+  </p:cSld>
+  <p:clrMapOvr>
+    <a:masterClrMapping/>
+  </p:clrMapOvr>
+</p:sld>
+</file>
+
+<file path=ppt/slides/slide8.xml><?xml version="1.0" encoding="utf-8"?>
+<p:sld xmlns:a="http://schemas.openxmlformats.org/drawingml/2006/main" xmlns:r="http://schemas.openxmlformats.org/officeDocument/2006/relationships" xmlns:p="http://schemas.openxmlformats.org/presentationml/2006/main">
+  <p:cSld>
+    <p:spTree>
+      <p:nvGrpSpPr>
+        <p:cNvPr id="1" name=""/>
+        <p:cNvGrpSpPr/>
+        <p:nvPr/>
+      </p:nvGrpSpPr>
+      <p:grpSpPr>
+        <a:xfrm>
+          <a:off x="0" y="0"/>
+          <a:ext cx="0" cy="0"/>
+          <a:chOff x="0" y="0"/>
+          <a:chExt cx="0" cy="0"/>
+        </a:xfrm>
+      </p:grpSpPr>
+      <p:sp>
+        <p:nvSpPr>
+          <p:cNvPr id="2" name="标题 1">
+            <a:extLst>
+              <a:ext uri="{FF2B5EF4-FFF2-40B4-BE49-F238E27FC236}">
+                <a16:creationId xmlns:a16="http://schemas.microsoft.com/office/drawing/2014/main" id="{20618421-B59A-AC9B-4C2B-A4D78327CE22}"/>
+              </a:ext>
+            </a:extLst>
+          </p:cNvPr>
+          <p:cNvSpPr>
+            <a:spLocks noGrp="1"/>
+          </p:cNvSpPr>
+          <p:nvPr>
+            <p:ph type="title"/>
+          </p:nvPr>
+        </p:nvSpPr>
+        <p:spPr>
+          <a:xfrm>
+            <a:off x="61313" y="457200"/>
+            <a:ext cx="3546860" cy="1600200"/>
+          </a:xfrm>
+        </p:spPr>
+        <p:txBody>
+          <a:bodyPr/>
+          <a:lstStyle/>
+          <a:p>
+            <a:r>
+              <a:rPr lang="en-US" altLang="zh-CN" dirty="0"/>
+              <a:t>2.Related Work</a:t>
+            </a:r>
+            <a:endParaRPr lang="zh-CN" altLang="en-US" dirty="0"/>
+          </a:p>
+        </p:txBody>
+      </p:sp>
+      <p:sp>
+        <p:nvSpPr>
+          <p:cNvPr id="3" name="内容占位符 2">
+            <a:extLst>
+              <a:ext uri="{FF2B5EF4-FFF2-40B4-BE49-F238E27FC236}">
+                <a16:creationId xmlns:a16="http://schemas.microsoft.com/office/drawing/2014/main" id="{ECBC0E2A-1B83-D774-9B95-798C9BE1E79B}"/>
+              </a:ext>
+            </a:extLst>
+          </p:cNvPr>
+          <p:cNvSpPr>
+            <a:spLocks noGrp="1"/>
+          </p:cNvSpPr>
+          <p:nvPr>
+            <p:ph idx="1"/>
+          </p:nvPr>
+        </p:nvSpPr>
+        <p:spPr>
+          <a:xfrm>
+            <a:off x="3694670" y="0"/>
+            <a:ext cx="8497330" cy="6857999"/>
+          </a:xfrm>
+        </p:spPr>
+        <p:txBody>
+          <a:bodyPr/>
+          <a:lstStyle/>
+          <a:p>
+            <a:r>
+              <a:rPr lang="en-US" altLang="zh-CN" dirty="0"/>
+              <a:t>nothing to tell</a:t>
+            </a:r>
+            <a:endParaRPr lang="zh-CN" altLang="en-US" dirty="0"/>
+          </a:p>
+        </p:txBody>
+      </p:sp>
+      <p:sp>
+        <p:nvSpPr>
+          <p:cNvPr id="4" name="文本占位符 3">
+            <a:extLst>
+              <a:ext uri="{FF2B5EF4-FFF2-40B4-BE49-F238E27FC236}">
+                <a16:creationId xmlns:a16="http://schemas.microsoft.com/office/drawing/2014/main" id="{351E9848-A693-DC47-CE0F-2FA538003518}"/>
+              </a:ext>
+            </a:extLst>
+          </p:cNvPr>
+          <p:cNvSpPr>
+            <a:spLocks noGrp="1"/>
+          </p:cNvSpPr>
+          <p:nvPr>
+            <p:ph type="body" sz="half" idx="2"/>
+          </p:nvPr>
+        </p:nvSpPr>
+        <p:spPr>
+          <a:xfrm>
+            <a:off x="61312" y="2057400"/>
+            <a:ext cx="3546861" cy="3811588"/>
+          </a:xfrm>
+        </p:spPr>
+        <p:txBody>
+          <a:bodyPr/>
+          <a:lstStyle/>
+          <a:p>
+            <a:r>
+              <a:rPr lang="en-US" altLang="zh-CN" dirty="0"/>
+              <a:t>2.1 Zero-shot Anomaly Segmentation</a:t>
+            </a:r>
+          </a:p>
+          <a:p>
+            <a:r>
+              <a:rPr lang="en-US" altLang="zh-CN" dirty="0"/>
+              <a:t>2.2 Foundation Models</a:t>
+            </a:r>
+          </a:p>
+          <a:p>
+            <a:r>
+              <a:rPr lang="en-US" altLang="zh-CN" dirty="0"/>
+              <a:t>2.3 </a:t>
+            </a:r>
+            <a:r>
+              <a:rPr lang="en-US" altLang="zh-CN" dirty="0">
+                <a:highlight>
+                  <a:srgbClr val="FFFF00"/>
+                </a:highlight>
+              </a:rPr>
+              <a:t>Cross-modal Interaction</a:t>
+            </a:r>
+            <a:endParaRPr lang="zh-CN" altLang="en-US" dirty="0">
+              <a:highlight>
+                <a:srgbClr val="FFFF00"/>
+              </a:highlight>
+            </a:endParaRPr>
+          </a:p>
+        </p:txBody>
+      </p:sp>
+    </p:spTree>
+    <p:extLst>
+      <p:ext uri="{BB962C8B-B14F-4D97-AF65-F5344CB8AC3E}">
+        <p14:creationId xmlns:p14="http://schemas.microsoft.com/office/powerpoint/2010/main" val="4291910778"/>
+      </p:ext>
+    </p:extLst>
+  </p:cSld>
+  <p:clrMapOvr>
+    <a:masterClrMapping/>
+  </p:clrMapOvr>
+</p:sld>
+</file>
+
+<file path=ppt/slides/slide9.xml><?xml version="1.0" encoding="utf-8"?>
+<p:sld xmlns:a="http://schemas.openxmlformats.org/drawingml/2006/main" xmlns:r="http://schemas.openxmlformats.org/officeDocument/2006/relationships" xmlns:p="http://schemas.openxmlformats.org/presentationml/2006/main">
+  <p:cSld>
+    <p:spTree>
+      <p:nvGrpSpPr>
+        <p:cNvPr id="1" name=""/>
+        <p:cNvGrpSpPr/>
+        <p:nvPr/>
+      </p:nvGrpSpPr>
+      <p:grpSpPr>
+        <a:xfrm>
+          <a:off x="0" y="0"/>
+          <a:ext cx="0" cy="0"/>
+          <a:chOff x="0" y="0"/>
+          <a:chExt cx="0" cy="0"/>
+        </a:xfrm>
+      </p:grpSpPr>
+      <p:sp>
+        <p:nvSpPr>
+          <p:cNvPr id="2" name="标题 1">
+            <a:extLst>
+              <a:ext uri="{FF2B5EF4-FFF2-40B4-BE49-F238E27FC236}">
+                <a16:creationId xmlns:a16="http://schemas.microsoft.com/office/drawing/2014/main" id="{20618421-B59A-AC9B-4C2B-A4D78327CE22}"/>
+              </a:ext>
+            </a:extLst>
+          </p:cNvPr>
+          <p:cNvSpPr>
+            <a:spLocks noGrp="1"/>
+          </p:cNvSpPr>
+          <p:nvPr>
+            <p:ph type="title"/>
+          </p:nvPr>
+        </p:nvSpPr>
+        <p:spPr>
+          <a:xfrm>
+            <a:off x="61313" y="457200"/>
+            <a:ext cx="3546860" cy="1600200"/>
+          </a:xfrm>
+        </p:spPr>
+        <p:txBody>
+          <a:bodyPr/>
+          <a:lstStyle/>
+          <a:p>
+            <a:r>
+              <a:rPr lang="en-US" altLang="zh-CN" dirty="0"/>
+              <a:t>3.Methodology</a:t>
+            </a:r>
+            <a:endParaRPr lang="zh-CN" altLang="en-US" dirty="0"/>
+          </a:p>
+        </p:txBody>
+      </p:sp>
+      <p:sp>
+        <p:nvSpPr>
+          <p:cNvPr id="3" name="内容占位符 2">
+            <a:extLst>
+              <a:ext uri="{FF2B5EF4-FFF2-40B4-BE49-F238E27FC236}">
+                <a16:creationId xmlns:a16="http://schemas.microsoft.com/office/drawing/2014/main" id="{ECBC0E2A-1B83-D774-9B95-798C9BE1E79B}"/>
+              </a:ext>
+            </a:extLst>
+          </p:cNvPr>
+          <p:cNvSpPr>
+            <a:spLocks noGrp="1"/>
+          </p:cNvSpPr>
+          <p:nvPr>
+            <p:ph idx="1"/>
+          </p:nvPr>
+        </p:nvSpPr>
+        <p:spPr>
+          <a:xfrm>
+            <a:off x="3496962" y="0"/>
+            <a:ext cx="8695038" cy="6857999"/>
+          </a:xfrm>
+        </p:spPr>
+        <p:txBody>
+          <a:bodyPr/>
+          <a:lstStyle/>
+          <a:p>
+            <a:r>
+              <a:rPr lang="en-US" altLang="zh-CN" dirty="0"/>
+              <a:t>we use CLIP for rough segmentation and use it to refine the segmentation result of SAM.</a:t>
+            </a:r>
+            <a:endParaRPr lang="zh-CN" altLang="en-US" dirty="0"/>
+          </a:p>
+        </p:txBody>
+      </p:sp>
+      <p:sp>
+        <p:nvSpPr>
+          <p:cNvPr id="4" name="文本占位符 3">
+            <a:extLst>
+              <a:ext uri="{FF2B5EF4-FFF2-40B4-BE49-F238E27FC236}">
+                <a16:creationId xmlns:a16="http://schemas.microsoft.com/office/drawing/2014/main" id="{351E9848-A693-DC47-CE0F-2FA538003518}"/>
+              </a:ext>
+            </a:extLst>
+          </p:cNvPr>
+          <p:cNvSpPr>
+            <a:spLocks noGrp="1"/>
+          </p:cNvSpPr>
+          <p:nvPr>
+            <p:ph type="body" sz="half" idx="2"/>
+          </p:nvPr>
+        </p:nvSpPr>
+        <p:spPr>
+          <a:xfrm>
+            <a:off x="61312" y="2057400"/>
+            <a:ext cx="3546861" cy="3811588"/>
+          </a:xfrm>
+        </p:spPr>
+        <p:txBody>
+          <a:bodyPr/>
+          <a:lstStyle/>
+          <a:p>
+            <a:r>
+              <a:rPr lang="en-US" altLang="zh-CN" dirty="0"/>
+              <a:t>3.1 </a:t>
+            </a:r>
+            <a:r>
+              <a:rPr lang="en-US" altLang="zh-CN" dirty="0">
+                <a:highlight>
+                  <a:srgbClr val="FFFF00"/>
+                </a:highlight>
+              </a:rPr>
+              <a:t>CLIP and SAM Collaboration</a:t>
+            </a:r>
+          </a:p>
+          <a:p>
+            <a:r>
+              <a:rPr lang="en-US" altLang="zh-CN" dirty="0"/>
+              <a:t>3.2 Unified Multi-scale Cross-modal Interaction</a:t>
+            </a:r>
+          </a:p>
+          <a:p>
+            <a:r>
+              <a:rPr lang="en-US" altLang="zh-CN" dirty="0"/>
+              <a:t>3.3 Multi-level Mask Refinement</a:t>
+            </a:r>
+          </a:p>
+          <a:p>
+            <a:r>
+              <a:rPr lang="en-US" altLang="zh-CN" dirty="0"/>
+              <a:t>3.4 Objective Function</a:t>
+            </a:r>
+            <a:endParaRPr lang="zh-CN" altLang="en-US" dirty="0"/>
+          </a:p>
+        </p:txBody>
+      </p:sp>
+      <p:pic>
+        <p:nvPicPr>
+          <p:cNvPr id="6" name="图片 5">
+            <a:extLst>
+              <a:ext uri="{FF2B5EF4-FFF2-40B4-BE49-F238E27FC236}">
+                <a16:creationId xmlns:a16="http://schemas.microsoft.com/office/drawing/2014/main" id="{3E000AD5-6F85-3FB8-B857-70C4B8D5F807}"/>
+              </a:ext>
+            </a:extLst>
+          </p:cNvPr>
+          <p:cNvPicPr>
+            <a:picLocks noChangeAspect="1"/>
+          </p:cNvPicPr>
+          <p:nvPr/>
+        </p:nvPicPr>
+        <p:blipFill>
+          <a:blip r:embed="rId2"/>
+          <a:stretch>
+            <a:fillRect/>
+          </a:stretch>
+        </p:blipFill>
+        <p:spPr>
+          <a:xfrm>
+            <a:off x="3657364" y="1182924"/>
+            <a:ext cx="8374233" cy="5560540"/>
+          </a:xfrm>
+          <a:prstGeom prst="rect">
+            <a:avLst/>
+          </a:prstGeom>
+        </p:spPr>
+      </p:pic>
+    </p:spTree>
+    <p:extLst>
+      <p:ext uri="{BB962C8B-B14F-4D97-AF65-F5344CB8AC3E}">
+        <p14:creationId xmlns:p14="http://schemas.microsoft.com/office/powerpoint/2010/main" val="4030215255"/>
       </p:ext>
     </p:extLst>
   </p:cSld>

</xml_diff>